<commit_message>
checked and updated d3/s4 slides
</commit_message>
<xml_diff>
--- a/doc/slides/day3/session4/seq2gff.pptx
+++ b/doc/slides/day3/session4/seq2gff.pptx
@@ -6,6 +6,9 @@
   </p:sldMasterIdLst>
   <p:sldIdLst>
     <p:sldId id="256" r:id="rId2"/>
+    <p:sldId id="257" r:id="rId3"/>
+    <p:sldId id="258" r:id="rId4"/>
+    <p:sldId id="259" r:id="rId5"/>
   </p:sldIdLst>
   <p:sldSz cx="9144000" cy="6858000" type="screen4x3"/>
   <p:notesSz cx="6858000" cy="9144000"/>
@@ -3135,10 +3138,10 @@
               <a:t> </a:t>
             </a:r>
             <a:r>
-              <a:rPr lang="nl-NL" smtClean="0"/>
+              <a:rPr lang="nl-NL" dirty="0" err="1" smtClean="0"/>
               <a:t>annotations</a:t>
             </a:r>
-            <a:endParaRPr lang="nl-NL"/>
+            <a:endParaRPr lang="nl-NL" dirty="0"/>
           </a:p>
         </p:txBody>
       </p:sp>
@@ -3165,6 +3168,899 @@
     <p:extLst>
       <p:ext uri="{BB962C8B-B14F-4D97-AF65-F5344CB8AC3E}">
         <p14:creationId xmlns:p14="http://schemas.microsoft.com/office/powerpoint/2010/main" val="2191256937"/>
+      </p:ext>
+    </p:extLst>
+  </p:cSld>
+  <p:clrMapOvr>
+    <a:masterClrMapping/>
+  </p:clrMapOvr>
+</p:sld>
+</file>
+
+<file path=ppt/slides/slide2.xml><?xml version="1.0" encoding="utf-8"?>
+<p:sld xmlns:a="http://schemas.openxmlformats.org/drawingml/2006/main" xmlns:r="http://schemas.openxmlformats.org/officeDocument/2006/relationships" xmlns:p="http://schemas.openxmlformats.org/presentationml/2006/main">
+  <p:cSld>
+    <p:spTree>
+      <p:nvGrpSpPr>
+        <p:cNvPr id="1" name=""/>
+        <p:cNvGrpSpPr/>
+        <p:nvPr/>
+      </p:nvGrpSpPr>
+      <p:grpSpPr>
+        <a:xfrm>
+          <a:off x="0" y="0"/>
+          <a:ext cx="0" cy="0"/>
+          <a:chOff x="0" y="0"/>
+          <a:chExt cx="0" cy="0"/>
+        </a:xfrm>
+      </p:grpSpPr>
+      <p:sp>
+        <p:nvSpPr>
+          <p:cNvPr id="2" name="Titel 1"/>
+          <p:cNvSpPr>
+            <a:spLocks noGrp="1"/>
+          </p:cNvSpPr>
+          <p:nvPr>
+            <p:ph type="title"/>
+          </p:nvPr>
+        </p:nvSpPr>
+        <p:spPr/>
+        <p:txBody>
+          <a:bodyPr>
+            <a:normAutofit/>
+          </a:bodyPr>
+          <a:lstStyle/>
+          <a:p>
+            <a:r>
+              <a:rPr lang="nl-NL" dirty="0" err="1" smtClean="0"/>
+              <a:t>Placing</a:t>
+            </a:r>
+            <a:r>
+              <a:rPr lang="nl-NL" dirty="0" smtClean="0"/>
+              <a:t> a locus on a </a:t>
+            </a:r>
+            <a:r>
+              <a:rPr lang="nl-NL" dirty="0" err="1" smtClean="0"/>
+              <a:t>genome</a:t>
+            </a:r>
+            <a:r>
+              <a:rPr lang="nl-NL" dirty="0" smtClean="0"/>
+              <a:t>	</a:t>
+            </a:r>
+            <a:endParaRPr lang="nl-NL" dirty="0"/>
+          </a:p>
+        </p:txBody>
+      </p:sp>
+      <p:sp>
+        <p:nvSpPr>
+          <p:cNvPr id="3" name="Tijdelijke aanduiding voor inhoud 2"/>
+          <p:cNvSpPr>
+            <a:spLocks noGrp="1"/>
+          </p:cNvSpPr>
+          <p:nvPr>
+            <p:ph idx="1"/>
+          </p:nvPr>
+        </p:nvSpPr>
+        <p:spPr/>
+        <p:txBody>
+          <a:bodyPr/>
+          <a:lstStyle/>
+          <a:p>
+            <a:r>
+              <a:rPr lang="nl-NL" dirty="0" err="1" smtClean="0"/>
+              <a:t>Given</a:t>
+            </a:r>
+            <a:r>
+              <a:rPr lang="nl-NL" dirty="0" smtClean="0"/>
+              <a:t> a </a:t>
+            </a:r>
+            <a:r>
+              <a:rPr lang="nl-NL" dirty="0" err="1" smtClean="0"/>
+              <a:t>sequence</a:t>
+            </a:r>
+            <a:r>
+              <a:rPr lang="nl-NL" dirty="0" smtClean="0"/>
+              <a:t> (say, a gene) </a:t>
+            </a:r>
+            <a:r>
+              <a:rPr lang="nl-NL" dirty="0" err="1" smtClean="0"/>
+              <a:t>and</a:t>
+            </a:r>
+            <a:r>
+              <a:rPr lang="nl-NL" dirty="0" smtClean="0"/>
+              <a:t> a </a:t>
+            </a:r>
+            <a:r>
+              <a:rPr lang="nl-NL" dirty="0" err="1" smtClean="0"/>
+              <a:t>reference</a:t>
+            </a:r>
+            <a:r>
+              <a:rPr lang="nl-NL" dirty="0" smtClean="0"/>
+              <a:t> </a:t>
+            </a:r>
+            <a:r>
+              <a:rPr lang="nl-NL" dirty="0" err="1" smtClean="0"/>
+              <a:t>genome</a:t>
+            </a:r>
+            <a:r>
+              <a:rPr lang="nl-NL" dirty="0" smtClean="0"/>
+              <a:t>, </a:t>
+            </a:r>
+            <a:r>
+              <a:rPr lang="nl-NL" dirty="0" err="1" smtClean="0"/>
+              <a:t>you</a:t>
+            </a:r>
+            <a:r>
+              <a:rPr lang="nl-NL" dirty="0" smtClean="0"/>
+              <a:t> </a:t>
+            </a:r>
+            <a:r>
+              <a:rPr lang="nl-NL" dirty="0" err="1" smtClean="0"/>
+              <a:t>can</a:t>
+            </a:r>
+            <a:r>
+              <a:rPr lang="nl-NL" dirty="0" smtClean="0"/>
+              <a:t>:</a:t>
+            </a:r>
+          </a:p>
+          <a:p>
+            <a:pPr lvl="1"/>
+            <a:r>
+              <a:rPr lang="nl-NL" dirty="0" smtClean="0"/>
+              <a:t>Index the </a:t>
+            </a:r>
+            <a:r>
+              <a:rPr lang="nl-NL" dirty="0" err="1" smtClean="0"/>
+              <a:t>genome</a:t>
+            </a:r>
+            <a:r>
+              <a:rPr lang="nl-NL" dirty="0" smtClean="0"/>
+              <a:t> </a:t>
+            </a:r>
+            <a:r>
+              <a:rPr lang="nl-NL" dirty="0" err="1" smtClean="0"/>
+              <a:t>using</a:t>
+            </a:r>
+            <a:r>
+              <a:rPr lang="nl-NL" dirty="0" smtClean="0"/>
+              <a:t> </a:t>
+            </a:r>
+            <a:r>
+              <a:rPr lang="nl-NL" dirty="0" err="1" smtClean="0"/>
+              <a:t>local</a:t>
+            </a:r>
+            <a:r>
+              <a:rPr lang="nl-NL" dirty="0" smtClean="0"/>
+              <a:t> BLAST (</a:t>
+            </a:r>
+            <a:r>
+              <a:rPr lang="nl-NL" b="1" i="1" dirty="0" err="1" smtClean="0"/>
+              <a:t>makeblastdb</a:t>
+            </a:r>
+            <a:r>
+              <a:rPr lang="nl-NL" b="1" i="1" dirty="0" smtClean="0"/>
+              <a:t> –</a:t>
+            </a:r>
+            <a:r>
+              <a:rPr lang="nl-NL" b="1" i="1" dirty="0" err="1" smtClean="0"/>
+              <a:t>dbtype</a:t>
+            </a:r>
+            <a:r>
+              <a:rPr lang="nl-NL" b="1" i="1" dirty="0" smtClean="0"/>
+              <a:t> </a:t>
+            </a:r>
+            <a:r>
+              <a:rPr lang="nl-NL" b="1" i="1" dirty="0" err="1" smtClean="0"/>
+              <a:t>nucl</a:t>
+            </a:r>
+            <a:r>
+              <a:rPr lang="nl-NL" b="1" i="1" dirty="0" smtClean="0"/>
+              <a:t> –in &lt;</a:t>
+            </a:r>
+            <a:r>
+              <a:rPr lang="nl-NL" b="1" i="1" dirty="0" err="1" smtClean="0"/>
+              <a:t>genome.fasta</a:t>
+            </a:r>
+            <a:r>
+              <a:rPr lang="nl-NL" b="1" i="1" dirty="0" smtClean="0"/>
+              <a:t>&gt;</a:t>
+            </a:r>
+            <a:r>
+              <a:rPr lang="nl-NL" dirty="0" smtClean="0"/>
+              <a:t>)</a:t>
+            </a:r>
+          </a:p>
+          <a:p>
+            <a:pPr lvl="1"/>
+            <a:r>
+              <a:rPr lang="nl-NL" dirty="0" smtClean="0"/>
+              <a:t>Query the </a:t>
+            </a:r>
+            <a:r>
+              <a:rPr lang="nl-NL" dirty="0" err="1" smtClean="0"/>
+              <a:t>sequence</a:t>
+            </a:r>
+            <a:r>
+              <a:rPr lang="nl-NL" dirty="0" smtClean="0"/>
+              <a:t> </a:t>
+            </a:r>
+            <a:r>
+              <a:rPr lang="nl-NL" dirty="0" err="1" smtClean="0"/>
+              <a:t>against</a:t>
+            </a:r>
+            <a:r>
+              <a:rPr lang="nl-NL" dirty="0" smtClean="0"/>
+              <a:t> the </a:t>
+            </a:r>
+            <a:r>
+              <a:rPr lang="nl-NL" dirty="0" err="1" smtClean="0"/>
+              <a:t>reference</a:t>
+            </a:r>
+            <a:r>
+              <a:rPr lang="nl-NL" dirty="0" smtClean="0"/>
+              <a:t> </a:t>
+            </a:r>
+            <a:r>
+              <a:rPr lang="nl-NL" dirty="0" err="1" smtClean="0"/>
+              <a:t>genome</a:t>
+            </a:r>
+            <a:r>
+              <a:rPr lang="nl-NL" dirty="0" smtClean="0"/>
+              <a:t> (</a:t>
+            </a:r>
+            <a:r>
+              <a:rPr lang="nl-NL" b="1" i="1" dirty="0" err="1" smtClean="0"/>
+              <a:t>blastn</a:t>
+            </a:r>
+            <a:r>
+              <a:rPr lang="nl-NL" b="1" i="1" dirty="0" smtClean="0"/>
+              <a:t> -</a:t>
+            </a:r>
+            <a:r>
+              <a:rPr lang="nl-NL" b="1" i="1" dirty="0" err="1" smtClean="0"/>
+              <a:t>db</a:t>
+            </a:r>
+            <a:r>
+              <a:rPr lang="nl-NL" b="1" i="1" dirty="0" smtClean="0"/>
+              <a:t> </a:t>
+            </a:r>
+            <a:r>
+              <a:rPr lang="nl-NL" b="1" i="1" dirty="0" smtClean="0"/>
+              <a:t>&lt;</a:t>
+            </a:r>
+            <a:r>
+              <a:rPr lang="nl-NL" b="1" i="1" dirty="0" err="1" smtClean="0"/>
+              <a:t>genome.fasta</a:t>
+            </a:r>
+            <a:r>
+              <a:rPr lang="nl-NL" b="1" i="1" dirty="0" smtClean="0"/>
+              <a:t>&gt;</a:t>
+            </a:r>
+            <a:r>
+              <a:rPr lang="nl-NL" b="1" i="1" dirty="0" smtClean="0"/>
+              <a:t> -query &lt;</a:t>
+            </a:r>
+            <a:r>
+              <a:rPr lang="nl-NL" b="1" i="1" dirty="0" err="1" smtClean="0"/>
+              <a:t>sequence.fasta</a:t>
+            </a:r>
+            <a:r>
+              <a:rPr lang="nl-NL" b="1" i="1" dirty="0" smtClean="0"/>
+              <a:t>&gt;</a:t>
+            </a:r>
+            <a:r>
+              <a:rPr lang="nl-NL" dirty="0" smtClean="0"/>
+              <a:t>)</a:t>
+            </a:r>
+          </a:p>
+          <a:p>
+            <a:pPr lvl="1"/>
+            <a:r>
+              <a:rPr lang="nl-NL" dirty="0" err="1" smtClean="0"/>
+              <a:t>Parse</a:t>
+            </a:r>
+            <a:r>
+              <a:rPr lang="nl-NL" dirty="0" smtClean="0"/>
+              <a:t> the </a:t>
+            </a:r>
+            <a:r>
+              <a:rPr lang="nl-NL" dirty="0" err="1" smtClean="0"/>
+              <a:t>result</a:t>
+            </a:r>
+            <a:r>
+              <a:rPr lang="nl-NL" dirty="0" smtClean="0"/>
+              <a:t> </a:t>
+            </a:r>
+            <a:r>
+              <a:rPr lang="nl-NL" dirty="0" err="1" smtClean="0"/>
+              <a:t>to</a:t>
+            </a:r>
+            <a:r>
+              <a:rPr lang="nl-NL" dirty="0" smtClean="0"/>
+              <a:t> get the </a:t>
+            </a:r>
+            <a:r>
+              <a:rPr lang="nl-NL" dirty="0" err="1" smtClean="0"/>
+              <a:t>genomic</a:t>
+            </a:r>
+            <a:r>
+              <a:rPr lang="nl-NL" dirty="0" smtClean="0"/>
+              <a:t> </a:t>
+            </a:r>
+            <a:r>
+              <a:rPr lang="nl-NL" dirty="0" err="1" smtClean="0"/>
+              <a:t>coordinates</a:t>
+            </a:r>
+            <a:endParaRPr lang="nl-NL" dirty="0"/>
+          </a:p>
+        </p:txBody>
+      </p:sp>
+    </p:spTree>
+    <p:extLst>
+      <p:ext uri="{BB962C8B-B14F-4D97-AF65-F5344CB8AC3E}">
+        <p14:creationId xmlns:p14="http://schemas.microsoft.com/office/powerpoint/2010/main" val="981519916"/>
+      </p:ext>
+    </p:extLst>
+  </p:cSld>
+  <p:clrMapOvr>
+    <a:masterClrMapping/>
+  </p:clrMapOvr>
+</p:sld>
+</file>
+
+<file path=ppt/slides/slide3.xml><?xml version="1.0" encoding="utf-8"?>
+<p:sld xmlns:a="http://schemas.openxmlformats.org/drawingml/2006/main" xmlns:r="http://schemas.openxmlformats.org/officeDocument/2006/relationships" xmlns:p="http://schemas.openxmlformats.org/presentationml/2006/main">
+  <p:cSld>
+    <p:spTree>
+      <p:nvGrpSpPr>
+        <p:cNvPr id="1" name=""/>
+        <p:cNvGrpSpPr/>
+        <p:nvPr/>
+      </p:nvGrpSpPr>
+      <p:grpSpPr>
+        <a:xfrm>
+          <a:off x="0" y="0"/>
+          <a:ext cx="0" cy="0"/>
+          <a:chOff x="0" y="0"/>
+          <a:chExt cx="0" cy="0"/>
+        </a:xfrm>
+      </p:grpSpPr>
+      <p:sp>
+        <p:nvSpPr>
+          <p:cNvPr id="2" name="Titel 1"/>
+          <p:cNvSpPr>
+            <a:spLocks noGrp="1"/>
+          </p:cNvSpPr>
+          <p:nvPr>
+            <p:ph type="title"/>
+          </p:nvPr>
+        </p:nvSpPr>
+        <p:spPr/>
+        <p:txBody>
+          <a:bodyPr>
+            <a:normAutofit fontScale="90000"/>
+          </a:bodyPr>
+          <a:lstStyle/>
+          <a:p>
+            <a:r>
+              <a:rPr lang="nl-NL" dirty="0" err="1" smtClean="0"/>
+              <a:t>Fetching</a:t>
+            </a:r>
+            <a:r>
+              <a:rPr lang="nl-NL" dirty="0" smtClean="0"/>
+              <a:t> a consensus </a:t>
+            </a:r>
+            <a:r>
+              <a:rPr lang="nl-NL" dirty="0" err="1" smtClean="0"/>
+              <a:t>sequence</a:t>
+            </a:r>
+            <a:r>
+              <a:rPr lang="nl-NL" dirty="0" smtClean="0"/>
+              <a:t> </a:t>
+            </a:r>
+            <a:r>
+              <a:rPr lang="nl-NL" dirty="0" err="1" smtClean="0"/>
+              <a:t>by</a:t>
+            </a:r>
+            <a:r>
+              <a:rPr lang="nl-NL" dirty="0" smtClean="0"/>
+              <a:t> </a:t>
+            </a:r>
+            <a:r>
+              <a:rPr lang="nl-NL" dirty="0" err="1" smtClean="0"/>
+              <a:t>genomic</a:t>
+            </a:r>
+            <a:r>
+              <a:rPr lang="nl-NL" dirty="0" smtClean="0"/>
+              <a:t> </a:t>
+            </a:r>
+            <a:r>
+              <a:rPr lang="nl-NL" dirty="0" err="1" smtClean="0"/>
+              <a:t>coordinates</a:t>
+            </a:r>
+            <a:endParaRPr lang="nl-NL" dirty="0"/>
+          </a:p>
+        </p:txBody>
+      </p:sp>
+      <p:sp>
+        <p:nvSpPr>
+          <p:cNvPr id="3" name="Tijdelijke aanduiding voor inhoud 2"/>
+          <p:cNvSpPr>
+            <a:spLocks noGrp="1"/>
+          </p:cNvSpPr>
+          <p:nvPr>
+            <p:ph idx="1"/>
+          </p:nvPr>
+        </p:nvSpPr>
+        <p:spPr/>
+        <p:txBody>
+          <a:bodyPr/>
+          <a:lstStyle/>
+          <a:p>
+            <a:r>
+              <a:rPr lang="nl-NL" dirty="0" smtClean="0"/>
+              <a:t>In the </a:t>
+            </a:r>
+            <a:r>
+              <a:rPr lang="nl-NL" dirty="0" err="1" smtClean="0"/>
+              <a:t>previous</a:t>
+            </a:r>
+            <a:r>
+              <a:rPr lang="nl-NL" dirty="0" smtClean="0"/>
+              <a:t> </a:t>
+            </a:r>
+            <a:r>
+              <a:rPr lang="nl-NL" dirty="0" err="1" smtClean="0"/>
+              <a:t>session</a:t>
+            </a:r>
+            <a:r>
+              <a:rPr lang="nl-NL" dirty="0" smtClean="0"/>
+              <a:t> we </a:t>
+            </a:r>
+            <a:r>
+              <a:rPr lang="nl-NL" dirty="0" err="1" smtClean="0"/>
+              <a:t>learned</a:t>
+            </a:r>
+            <a:r>
+              <a:rPr lang="nl-NL" dirty="0" smtClean="0"/>
+              <a:t> </a:t>
+            </a:r>
+            <a:r>
+              <a:rPr lang="nl-NL" dirty="0" err="1" smtClean="0"/>
+              <a:t>how</a:t>
+            </a:r>
+            <a:r>
+              <a:rPr lang="nl-NL" dirty="0" smtClean="0"/>
+              <a:t> </a:t>
+            </a:r>
+            <a:r>
+              <a:rPr lang="nl-NL" dirty="0" err="1" smtClean="0"/>
+              <a:t>to</a:t>
+            </a:r>
+            <a:r>
+              <a:rPr lang="nl-NL" dirty="0" smtClean="0"/>
+              <a:t> </a:t>
+            </a:r>
+            <a:r>
+              <a:rPr lang="nl-NL" dirty="0" err="1" smtClean="0"/>
+              <a:t>fetch</a:t>
+            </a:r>
+            <a:r>
+              <a:rPr lang="nl-NL" dirty="0" smtClean="0"/>
+              <a:t> a consensus </a:t>
+            </a:r>
+            <a:r>
+              <a:rPr lang="nl-NL" dirty="0" err="1" smtClean="0"/>
+              <a:t>sequence</a:t>
+            </a:r>
+            <a:r>
+              <a:rPr lang="nl-NL" dirty="0" smtClean="0"/>
+              <a:t> </a:t>
+            </a:r>
+            <a:r>
+              <a:rPr lang="nl-NL" dirty="0" err="1" smtClean="0"/>
+              <a:t>by</a:t>
+            </a:r>
+            <a:r>
+              <a:rPr lang="nl-NL" dirty="0" smtClean="0"/>
+              <a:t> </a:t>
+            </a:r>
+            <a:r>
+              <a:rPr lang="nl-NL" dirty="0" err="1" smtClean="0"/>
+              <a:t>coordinates</a:t>
+            </a:r>
+            <a:r>
+              <a:rPr lang="nl-NL" dirty="0" smtClean="0"/>
+              <a:t> </a:t>
+            </a:r>
+            <a:r>
+              <a:rPr lang="nl-NL" dirty="0" err="1" smtClean="0"/>
+              <a:t>using</a:t>
+            </a:r>
+            <a:r>
+              <a:rPr lang="nl-NL" dirty="0" smtClean="0"/>
+              <a:t> </a:t>
+            </a:r>
+            <a:r>
+              <a:rPr lang="nl-NL" b="1" i="1" dirty="0" err="1" smtClean="0"/>
+              <a:t>samtools</a:t>
+            </a:r>
+            <a:r>
+              <a:rPr lang="nl-NL" b="1" i="1" dirty="0" smtClean="0"/>
+              <a:t> </a:t>
+            </a:r>
+            <a:r>
+              <a:rPr lang="nl-NL" b="1" i="1" dirty="0" err="1" smtClean="0"/>
+              <a:t>mpileup</a:t>
+            </a:r>
+            <a:r>
+              <a:rPr lang="nl-NL" dirty="0" smtClean="0"/>
+              <a:t> (</a:t>
+            </a:r>
+            <a:r>
+              <a:rPr lang="nl-NL" dirty="0" err="1" smtClean="0"/>
+              <a:t>and</a:t>
+            </a:r>
+            <a:r>
+              <a:rPr lang="nl-NL" dirty="0" smtClean="0"/>
+              <a:t> </a:t>
+            </a:r>
+            <a:r>
+              <a:rPr lang="nl-NL" dirty="0" err="1" smtClean="0"/>
+              <a:t>friends</a:t>
+            </a:r>
+            <a:r>
+              <a:rPr lang="nl-NL" dirty="0" smtClean="0"/>
+              <a:t>)</a:t>
+            </a:r>
+          </a:p>
+          <a:p>
+            <a:r>
+              <a:rPr lang="nl-NL" dirty="0" smtClean="0"/>
+              <a:t>We </a:t>
+            </a:r>
+            <a:r>
+              <a:rPr lang="nl-NL" dirty="0" err="1" smtClean="0"/>
+              <a:t>should</a:t>
+            </a:r>
+            <a:r>
+              <a:rPr lang="nl-NL" dirty="0" smtClean="0"/>
+              <a:t> </a:t>
+            </a:r>
+            <a:r>
+              <a:rPr lang="nl-NL" dirty="0" err="1" smtClean="0"/>
+              <a:t>now</a:t>
+            </a:r>
+            <a:r>
+              <a:rPr lang="nl-NL" dirty="0" smtClean="0"/>
+              <a:t> </a:t>
+            </a:r>
+            <a:r>
+              <a:rPr lang="nl-NL" dirty="0" err="1" smtClean="0"/>
+              <a:t>be</a:t>
+            </a:r>
+            <a:r>
+              <a:rPr lang="nl-NL" dirty="0" smtClean="0"/>
+              <a:t> </a:t>
+            </a:r>
+            <a:r>
+              <a:rPr lang="nl-NL" dirty="0" err="1" smtClean="0"/>
+              <a:t>able</a:t>
+            </a:r>
+            <a:r>
+              <a:rPr lang="nl-NL" dirty="0" smtClean="0"/>
+              <a:t> </a:t>
+            </a:r>
+            <a:r>
+              <a:rPr lang="nl-NL" dirty="0" err="1" smtClean="0"/>
+              <a:t>to</a:t>
+            </a:r>
+            <a:r>
+              <a:rPr lang="nl-NL" dirty="0" smtClean="0"/>
+              <a:t> get the </a:t>
+            </a:r>
+            <a:r>
+              <a:rPr lang="nl-NL" dirty="0" err="1" smtClean="0"/>
+              <a:t>homolog</a:t>
+            </a:r>
+            <a:r>
+              <a:rPr lang="nl-NL" dirty="0" smtClean="0"/>
+              <a:t>(s) </a:t>
+            </a:r>
+            <a:r>
+              <a:rPr lang="nl-NL" dirty="0" err="1" smtClean="0"/>
+              <a:t>for</a:t>
+            </a:r>
+            <a:r>
+              <a:rPr lang="nl-NL" dirty="0" smtClean="0"/>
+              <a:t> </a:t>
+            </a:r>
+            <a:r>
+              <a:rPr lang="nl-NL" dirty="0" err="1" smtClean="0"/>
+              <a:t>an</a:t>
+            </a:r>
+            <a:r>
+              <a:rPr lang="nl-NL" dirty="0" smtClean="0"/>
+              <a:t> </a:t>
+            </a:r>
+            <a:r>
+              <a:rPr lang="nl-NL" dirty="0" err="1" smtClean="0"/>
+              <a:t>unknown</a:t>
+            </a:r>
+            <a:r>
+              <a:rPr lang="nl-NL" dirty="0" smtClean="0"/>
+              <a:t> input </a:t>
+            </a:r>
+            <a:r>
+              <a:rPr lang="nl-NL" dirty="0" err="1" smtClean="0"/>
+              <a:t>sequence</a:t>
+            </a:r>
+            <a:r>
+              <a:rPr lang="nl-NL" dirty="0" smtClean="0"/>
+              <a:t> </a:t>
+            </a:r>
+            <a:r>
+              <a:rPr lang="nl-NL" dirty="0" err="1" smtClean="0"/>
+              <a:t>from</a:t>
+            </a:r>
+            <a:r>
+              <a:rPr lang="nl-NL" dirty="0" smtClean="0"/>
+              <a:t> </a:t>
+            </a:r>
+            <a:r>
+              <a:rPr lang="nl-NL" dirty="0" err="1" smtClean="0"/>
+              <a:t>our</a:t>
+            </a:r>
+            <a:r>
+              <a:rPr lang="nl-NL" dirty="0" smtClean="0"/>
+              <a:t> BAM file.</a:t>
+            </a:r>
+            <a:endParaRPr lang="nl-NL" dirty="0"/>
+          </a:p>
+        </p:txBody>
+      </p:sp>
+    </p:spTree>
+    <p:extLst>
+      <p:ext uri="{BB962C8B-B14F-4D97-AF65-F5344CB8AC3E}">
+        <p14:creationId xmlns:p14="http://schemas.microsoft.com/office/powerpoint/2010/main" val="1241193073"/>
+      </p:ext>
+    </p:extLst>
+  </p:cSld>
+  <p:clrMapOvr>
+    <a:masterClrMapping/>
+  </p:clrMapOvr>
+</p:sld>
+</file>
+
+<file path=ppt/slides/slide4.xml><?xml version="1.0" encoding="utf-8"?>
+<p:sld xmlns:a="http://schemas.openxmlformats.org/drawingml/2006/main" xmlns:r="http://schemas.openxmlformats.org/officeDocument/2006/relationships" xmlns:p="http://schemas.openxmlformats.org/presentationml/2006/main">
+  <p:cSld>
+    <p:spTree>
+      <p:nvGrpSpPr>
+        <p:cNvPr id="1" name=""/>
+        <p:cNvGrpSpPr/>
+        <p:nvPr/>
+      </p:nvGrpSpPr>
+      <p:grpSpPr>
+        <a:xfrm>
+          <a:off x="0" y="0"/>
+          <a:ext cx="0" cy="0"/>
+          <a:chOff x="0" y="0"/>
+          <a:chExt cx="0" cy="0"/>
+        </a:xfrm>
+      </p:grpSpPr>
+      <p:sp>
+        <p:nvSpPr>
+          <p:cNvPr id="2" name="Titel 1"/>
+          <p:cNvSpPr>
+            <a:spLocks noGrp="1"/>
+          </p:cNvSpPr>
+          <p:nvPr>
+            <p:ph type="title"/>
+          </p:nvPr>
+        </p:nvSpPr>
+        <p:spPr/>
+        <p:txBody>
+          <a:bodyPr/>
+          <a:lstStyle/>
+          <a:p>
+            <a:r>
+              <a:rPr lang="nl-NL" dirty="0" err="1" smtClean="0"/>
+              <a:t>Exercise</a:t>
+            </a:r>
+            <a:endParaRPr lang="nl-NL" dirty="0"/>
+          </a:p>
+        </p:txBody>
+      </p:sp>
+      <p:sp>
+        <p:nvSpPr>
+          <p:cNvPr id="3" name="Tijdelijke aanduiding voor inhoud 2"/>
+          <p:cNvSpPr>
+            <a:spLocks noGrp="1"/>
+          </p:cNvSpPr>
+          <p:nvPr>
+            <p:ph idx="1"/>
+          </p:nvPr>
+        </p:nvSpPr>
+        <p:spPr/>
+        <p:txBody>
+          <a:bodyPr/>
+          <a:lstStyle/>
+          <a:p>
+            <a:r>
+              <a:rPr lang="nl-NL" dirty="0" smtClean="0"/>
+              <a:t>For the file </a:t>
+            </a:r>
+            <a:r>
+              <a:rPr lang="nl-NL" b="1" i="1" dirty="0" smtClean="0"/>
+              <a:t>data/</a:t>
+            </a:r>
+            <a:r>
+              <a:rPr lang="nl-NL" b="1" i="1" dirty="0" err="1" smtClean="0"/>
+              <a:t>fasta</a:t>
+            </a:r>
+            <a:r>
+              <a:rPr lang="nl-NL" b="1" i="1" dirty="0" smtClean="0"/>
+              <a:t>/</a:t>
+            </a:r>
+            <a:r>
+              <a:rPr lang="nl-NL" b="1" i="1" dirty="0" err="1" smtClean="0"/>
+              <a:t>query.fa</a:t>
+            </a:r>
+            <a:r>
+              <a:rPr lang="nl-NL" dirty="0" smtClean="0"/>
+              <a:t>:</a:t>
+            </a:r>
+          </a:p>
+          <a:p>
+            <a:pPr lvl="1"/>
+            <a:r>
+              <a:rPr lang="nl-NL" dirty="0" err="1" smtClean="0"/>
+              <a:t>find</a:t>
+            </a:r>
+            <a:r>
+              <a:rPr lang="nl-NL" dirty="0" smtClean="0"/>
+              <a:t> out, </a:t>
+            </a:r>
+            <a:r>
+              <a:rPr lang="nl-NL" dirty="0" err="1" smtClean="0"/>
+              <a:t>by</a:t>
+            </a:r>
+            <a:r>
+              <a:rPr lang="nl-NL" dirty="0" smtClean="0"/>
+              <a:t> </a:t>
+            </a:r>
+            <a:r>
+              <a:rPr lang="nl-NL" dirty="0" err="1" smtClean="0"/>
+              <a:t>BLASTing</a:t>
+            </a:r>
+            <a:r>
+              <a:rPr lang="nl-NL" dirty="0" smtClean="0"/>
+              <a:t>, the </a:t>
+            </a:r>
+            <a:r>
+              <a:rPr lang="nl-NL" dirty="0" err="1" smtClean="0"/>
+              <a:t>genomic</a:t>
+            </a:r>
+            <a:r>
+              <a:rPr lang="nl-NL" dirty="0" smtClean="0"/>
+              <a:t> </a:t>
+            </a:r>
+            <a:r>
+              <a:rPr lang="nl-NL" dirty="0" err="1" smtClean="0"/>
+              <a:t>coordinates</a:t>
+            </a:r>
+            <a:r>
+              <a:rPr lang="nl-NL" dirty="0" smtClean="0"/>
+              <a:t> of the best hit on the </a:t>
+            </a:r>
+            <a:r>
+              <a:rPr lang="nl-NL" dirty="0" err="1" smtClean="0"/>
+              <a:t>reference</a:t>
+            </a:r>
+            <a:r>
+              <a:rPr lang="nl-NL" dirty="0" smtClean="0"/>
+              <a:t> </a:t>
+            </a:r>
+            <a:r>
+              <a:rPr lang="nl-NL" dirty="0" err="1" smtClean="0"/>
+              <a:t>genome</a:t>
+            </a:r>
+            <a:endParaRPr lang="nl-NL" dirty="0" smtClean="0"/>
+          </a:p>
+          <a:p>
+            <a:pPr lvl="1"/>
+            <a:r>
+              <a:rPr lang="nl-NL" dirty="0" err="1" smtClean="0"/>
+              <a:t>find</a:t>
+            </a:r>
+            <a:r>
+              <a:rPr lang="nl-NL" dirty="0" smtClean="0"/>
+              <a:t> out the ID(s) of features </a:t>
+            </a:r>
+            <a:r>
+              <a:rPr lang="nl-NL" dirty="0" err="1" smtClean="0"/>
+              <a:t>near</a:t>
+            </a:r>
+            <a:r>
+              <a:rPr lang="nl-NL" dirty="0" smtClean="0"/>
+              <a:t> </a:t>
+            </a:r>
+            <a:r>
+              <a:rPr lang="nl-NL" dirty="0" err="1" smtClean="0"/>
+              <a:t>those</a:t>
+            </a:r>
+            <a:r>
+              <a:rPr lang="nl-NL" dirty="0" smtClean="0"/>
+              <a:t> </a:t>
+            </a:r>
+            <a:r>
+              <a:rPr lang="nl-NL" dirty="0" err="1" smtClean="0"/>
+              <a:t>coordinates</a:t>
+            </a:r>
+            <a:r>
+              <a:rPr lang="nl-NL" dirty="0" smtClean="0"/>
+              <a:t> in the GFF3 file</a:t>
+            </a:r>
+          </a:p>
+          <a:p>
+            <a:pPr lvl="1"/>
+            <a:r>
+              <a:rPr lang="nl-NL" dirty="0" smtClean="0"/>
+              <a:t>extract the </a:t>
+            </a:r>
+            <a:r>
+              <a:rPr lang="nl-NL" dirty="0" err="1" smtClean="0"/>
+              <a:t>homologous</a:t>
+            </a:r>
+            <a:r>
+              <a:rPr lang="nl-NL" dirty="0" smtClean="0"/>
+              <a:t> </a:t>
+            </a:r>
+            <a:r>
+              <a:rPr lang="nl-NL" dirty="0" err="1" smtClean="0"/>
+              <a:t>sequence</a:t>
+            </a:r>
+            <a:r>
+              <a:rPr lang="nl-NL" dirty="0" smtClean="0"/>
+              <a:t> </a:t>
+            </a:r>
+            <a:r>
+              <a:rPr lang="nl-NL" dirty="0" err="1" smtClean="0"/>
+              <a:t>for</a:t>
+            </a:r>
+            <a:r>
+              <a:rPr lang="nl-NL" dirty="0" smtClean="0"/>
+              <a:t> </a:t>
+            </a:r>
+            <a:r>
+              <a:rPr lang="nl-NL" dirty="0" err="1" smtClean="0"/>
+              <a:t>that</a:t>
+            </a:r>
+            <a:r>
+              <a:rPr lang="nl-NL" dirty="0" smtClean="0"/>
+              <a:t> feature </a:t>
+            </a:r>
+            <a:r>
+              <a:rPr lang="nl-NL" dirty="0" err="1" smtClean="0"/>
+              <a:t>from</a:t>
+            </a:r>
+            <a:r>
+              <a:rPr lang="nl-NL" dirty="0" smtClean="0"/>
+              <a:t> the </a:t>
+            </a:r>
+            <a:r>
+              <a:rPr lang="nl-NL" smtClean="0"/>
+              <a:t>BAM file</a:t>
+            </a:r>
+            <a:endParaRPr lang="nl-NL" dirty="0"/>
+          </a:p>
+        </p:txBody>
+      </p:sp>
+    </p:spTree>
+    <p:extLst>
+      <p:ext uri="{BB962C8B-B14F-4D97-AF65-F5344CB8AC3E}">
+        <p14:creationId xmlns:p14="http://schemas.microsoft.com/office/powerpoint/2010/main" val="1004175728"/>
       </p:ext>
     </p:extLst>
   </p:cSld>

</xml_diff>